<commit_message>
Se actualiza las vistas skethcs, mockups, wireframes y el codigo HTML creado como vistas iniciales del proyecto
</commit_message>
<xml_diff>
--- a/app/app_documentacion/1er_tri/Presentación del proyecto/1_1_1_presentacion_proyecto-convertido.pptx
+++ b/app/app_documentacion/1er_tri/Presentación del proyecto/1_1_1_presentacion_proyecto-convertido.pptx
@@ -227,7 +227,7 @@
           <a:p>
             <a:fld id="{BF5B5CA8-A6DA-4617-9879-3DB3DB4491FD}" type="datetimeFigureOut">
               <a:rPr lang="es-CO" smtClean="0"/>
-              <a:t>12/12/2021</a:t>
+              <a:t>21/07/2022</a:t>
             </a:fld>
             <a:endParaRPr lang="es-CO"/>
           </a:p>
@@ -802,7 +802,7 @@
           <a:p>
             <a:fld id="{1D8BD707-D9CF-40AE-B4C6-C98DA3205C09}" type="datetimeFigureOut">
               <a:rPr lang="en-US"/>
-              <a:t>12/12/2021</a:t>
+              <a:t>7/21/2022</a:t>
             </a:fld>
             <a:endParaRPr lang="en-US"/>
           </a:p>
@@ -1016,7 +1016,7 @@
           <a:p>
             <a:fld id="{1D8BD707-D9CF-40AE-B4C6-C98DA3205C09}" type="datetimeFigureOut">
               <a:rPr lang="en-US"/>
-              <a:t>12/12/2021</a:t>
+              <a:t>7/21/2022</a:t>
             </a:fld>
             <a:endParaRPr lang="en-US"/>
           </a:p>
@@ -1319,7 +1319,7 @@
           <a:p>
             <a:fld id="{1D8BD707-D9CF-40AE-B4C6-C98DA3205C09}" type="datetimeFigureOut">
               <a:rPr lang="en-US"/>
-              <a:t>12/12/2021</a:t>
+              <a:t>7/21/2022</a:t>
             </a:fld>
             <a:endParaRPr lang="en-US"/>
           </a:p>
@@ -1467,7 +1467,7 @@
           <a:p>
             <a:fld id="{1D8BD707-D9CF-40AE-B4C6-C98DA3205C09}" type="datetimeFigureOut">
               <a:rPr lang="en-US"/>
-              <a:t>12/12/2021</a:t>
+              <a:t>7/21/2022</a:t>
             </a:fld>
             <a:endParaRPr lang="en-US"/>
           </a:p>
@@ -1586,7 +1586,7 @@
           <a:p>
             <a:fld id="{1D8BD707-D9CF-40AE-B4C6-C98DA3205C09}" type="datetimeFigureOut">
               <a:rPr lang="en-US"/>
-              <a:t>12/12/2021</a:t>
+              <a:t>7/21/2022</a:t>
             </a:fld>
             <a:endParaRPr lang="en-US"/>
           </a:p>
@@ -1811,7 +1811,7 @@
           <a:p>
             <a:fld id="{1D8BD707-D9CF-40AE-B4C6-C98DA3205C09}" type="datetimeFigureOut">
               <a:rPr lang="en-US"/>
-              <a:t>12/12/2021</a:t>
+              <a:t>7/21/2022</a:t>
             </a:fld>
             <a:endParaRPr lang="en-US"/>
           </a:p>
@@ -11831,7 +11831,27 @@
                 <a:latin typeface="Carlito"/>
                 <a:cs typeface="Carlito"/>
               </a:rPr>
-              <a:t>A continuación se presentaran el objetico general y los objetivos específicos del proyecto</a:t>
+              <a:t>A continuación se presentaran </a:t>
+            </a:r>
+            <a:r>
+              <a:rPr lang="es-CO" spc="-40">
+                <a:solidFill>
+                  <a:srgbClr val="404040"/>
+                </a:solidFill>
+                <a:latin typeface="Carlito"/>
+                <a:cs typeface="Carlito"/>
+              </a:rPr>
+              <a:t>el objetivo </a:t>
+            </a:r>
+            <a:r>
+              <a:rPr lang="es-CO" spc="-40" dirty="0">
+                <a:solidFill>
+                  <a:srgbClr val="404040"/>
+                </a:solidFill>
+                <a:latin typeface="Carlito"/>
+                <a:cs typeface="Carlito"/>
+              </a:rPr>
+              <a:t>general y los objetivos específicos del proyecto</a:t>
             </a:r>
             <a:endParaRPr sz="1800" dirty="0">
               <a:latin typeface="Carlito"/>

</xml_diff>